<commit_message>
For Bug 36035 70425 Provide proper teplate for pt-BR
</commit_message>
<xml_diff>
--- a/new/pt-BR/new.pptx
+++ b/new/pt-BR/new.pptx
@@ -14,7 +14,7 @@
   <p:notesSz cx="6858000" cy="9144000"/>
   <p:defaultTextStyle>
     <a:defPPr>
-      <a:defRPr lang="el-GR"/>
+      <a:defRPr lang="pt-BR"/>
     </a:defPPr>
     <a:lvl1pPr marL="0" algn="l" defTabSz="914400" rtl="0" eaLnBrk="1" latinLnBrk="0" hangingPunct="1">
       <a:defRPr sz="1800" kern="1200">
@@ -142,7 +142,7 @@
       </p:grpSpPr>
       <p:sp>
         <p:nvSpPr>
-          <p:cNvPr id="2" name="Θέση κεφαλίδας 1"/>
+          <p:cNvPr id="2" name="Espaço reservado para cabeçalho 1"/>
           <p:cNvSpPr>
             <a:spLocks noGrp="1"/>
           </p:cNvSpPr>
@@ -167,13 +167,13 @@
             </a:lvl1pPr>
           </a:lstStyle>
           <a:p>
-            <a:endParaRPr lang="el-GR"/>
-          </a:p>
-        </p:txBody>
-      </p:sp>
-      <p:sp>
-        <p:nvSpPr>
-          <p:cNvPr id="3" name="Θέση ημερομηνίας 2"/>
+            <a:endParaRPr lang="pt-BR"/>
+          </a:p>
+        </p:txBody>
+      </p:sp>
+      <p:sp>
+        <p:nvSpPr>
+          <p:cNvPr id="3" name="Marcador de Posição da Data 2"/>
           <p:cNvSpPr>
             <a:spLocks noGrp="1"/>
           </p:cNvSpPr>
@@ -199,16 +199,16 @@
           </a:lstStyle>
           <a:p>
             <a:fld id="{3632E96E-41F7-40C5-8419-297958CC00FA}" type="datetimeFigureOut">
-              <a:rPr lang="el-GR" smtClean="0"/>
+              <a:rPr lang="pt-BR" smtClean="0"/>
               <a:t>10/30/2013</a:t>
             </a:fld>
-            <a:endParaRPr lang="el-GR"/>
-          </a:p>
-        </p:txBody>
-      </p:sp>
-      <p:sp>
-        <p:nvSpPr>
-          <p:cNvPr id="4" name="Θέση εικόνας διαφανειών 3"/>
+            <a:endParaRPr lang="pt-BR"/>
+          </a:p>
+        </p:txBody>
+      </p:sp>
+      <p:sp>
+        <p:nvSpPr>
+          <p:cNvPr id="4" name="Espaço reservado para imagem de slide 3"/>
           <p:cNvSpPr>
             <a:spLocks noGrp="1" noRot="1" noChangeAspect="1"/>
           </p:cNvSpPr>
@@ -235,13 +235,13 @@
           <a:bodyPr vert="horz" lIns="91440" tIns="45720" rIns="91440" bIns="45720" rtlCol="0" anchor="ctr"/>
           <a:lstStyle/>
           <a:p>
-            <a:endParaRPr lang="el-GR"/>
-          </a:p>
-        </p:txBody>
-      </p:sp>
-      <p:sp>
-        <p:nvSpPr>
-          <p:cNvPr id="5" name="Θέση σημειώσεις 4"/>
+            <a:endParaRPr lang="pt-BR"/>
+          </a:p>
+        </p:txBody>
+      </p:sp>
+      <p:sp>
+        <p:nvSpPr>
+          <p:cNvPr id="5" name="Espaço reservado para notas 4"/>
           <p:cNvSpPr>
             <a:spLocks noGrp="1"/>
           </p:cNvSpPr>
@@ -264,44 +264,44 @@
           <a:p>
             <a:pPr lvl="0"/>
             <a:r>
-              <a:rPr lang="el-GR" smtClean="0"/>
-              <a:t>Στυλ υποδείγματος κειμένου</a:t>
+              <a:rPr lang="pt-BR" smtClean="0"/>
+              <a:t>Clique para editar os estilos</a:t>
             </a:r>
           </a:p>
           <a:p>
             <a:pPr lvl="1"/>
             <a:r>
-              <a:rPr lang="el-GR" smtClean="0"/>
-              <a:t>Δεύτερου επιπέδου</a:t>
+              <a:rPr lang="pt-BR" smtClean="0"/>
+              <a:t>Segundo nível</a:t>
             </a:r>
           </a:p>
           <a:p>
             <a:pPr lvl="2"/>
             <a:r>
-              <a:rPr lang="el-GR" smtClean="0"/>
-              <a:t>Τρίτου επιπέδου</a:t>
+              <a:rPr lang="pt-BR" smtClean="0"/>
+              <a:t>Terceiro nível</a:t>
             </a:r>
           </a:p>
           <a:p>
             <a:pPr lvl="3"/>
             <a:r>
-              <a:rPr lang="el-GR" smtClean="0"/>
-              <a:t>Τέταρτου επιπέδου</a:t>
+              <a:rPr lang="pt-BR" smtClean="0"/>
+              <a:t>Quarto nível</a:t>
             </a:r>
           </a:p>
           <a:p>
             <a:pPr lvl="4"/>
             <a:r>
-              <a:rPr lang="el-GR" smtClean="0"/>
-              <a:t>Πέμπτου επιπέδου</a:t>
-            </a:r>
-            <a:endParaRPr lang="el-GR"/>
-          </a:p>
-        </p:txBody>
-      </p:sp>
-      <p:sp>
-        <p:nvSpPr>
-          <p:cNvPr id="6" name="Θέση υποσέλιδου 5"/>
+              <a:rPr lang="pt-BR" smtClean="0"/>
+              <a:t>Quinto nível</a:t>
+            </a:r>
+            <a:endParaRPr lang="pt-BR"/>
+          </a:p>
+        </p:txBody>
+      </p:sp>
+      <p:sp>
+        <p:nvSpPr>
+          <p:cNvPr id="6" name="Marcador de Posição do Rodapé 5"/>
           <p:cNvSpPr>
             <a:spLocks noGrp="1"/>
           </p:cNvSpPr>
@@ -326,13 +326,13 @@
             </a:lvl1pPr>
           </a:lstStyle>
           <a:p>
-            <a:endParaRPr lang="el-GR"/>
-          </a:p>
-        </p:txBody>
-      </p:sp>
-      <p:sp>
-        <p:nvSpPr>
-          <p:cNvPr id="7" name="Θέση αριθμού διαφάνειας 6"/>
+            <a:endParaRPr lang="pt-BR"/>
+          </a:p>
+        </p:txBody>
+      </p:sp>
+      <p:sp>
+        <p:nvSpPr>
+          <p:cNvPr id="7" name="Marcador de Posição do Número do Diapositivo 6"/>
           <p:cNvSpPr>
             <a:spLocks noGrp="1"/>
           </p:cNvSpPr>
@@ -358,10 +358,10 @@
           </a:lstStyle>
           <a:p>
             <a:fld id="{2E6999B8-B6B4-4561-A3CD-BBCDAB9FC9D9}" type="slidenum">
-              <a:rPr lang="el-GR" smtClean="0"/>
+              <a:rPr lang="pt-BR" smtClean="0"/>
               <a:t>‹#›</a:t>
             </a:fld>
-            <a:endParaRPr lang="el-GR"/>
+            <a:endParaRPr lang="pt-BR"/>
           </a:p>
         </p:txBody>
       </p:sp>
@@ -487,7 +487,7 @@
       </p:grpSpPr>
       <p:sp>
         <p:nvSpPr>
-          <p:cNvPr id="2" name="Θέση εικόνας διαφανειών 1"/>
+          <p:cNvPr id="2" name="Espaço reservado para imagem de slide 1"/>
           <p:cNvSpPr>
             <a:spLocks noGrp="1" noRot="1" noChangeAspect="1"/>
           </p:cNvSpPr>
@@ -504,7 +504,7 @@
       </p:sp>
       <p:sp>
         <p:nvSpPr>
-          <p:cNvPr id="3" name="Θέση σημειώσεις 2"/>
+          <p:cNvPr id="3" name="Espaço reservado para notas 2"/>
           <p:cNvSpPr>
             <a:spLocks noGrp="1"/>
           </p:cNvSpPr>
@@ -517,7 +517,7 @@
           <a:bodyPr/>
           <a:lstStyle/>
           <a:p>
-            <a:endParaRPr lang="el-GR" dirty="0">
+            <a:endParaRPr lang="pt-BR" dirty="0">
               <a:latin typeface="Arial" panose="020B0604020202020204" pitchFamily="34" charset="0"/>
               <a:cs typeface="Arial" panose="020B0604020202020204" pitchFamily="34" charset="0"/>
             </a:endParaRPr>
@@ -526,7 +526,7 @@
       </p:sp>
       <p:sp>
         <p:nvSpPr>
-          <p:cNvPr id="4" name="Θέση αριθμού διαφάνειας 3"/>
+          <p:cNvPr id="4" name="Marcador de Posição do Número do Diapositivo 3"/>
           <p:cNvSpPr>
             <a:spLocks noGrp="1"/>
           </p:cNvSpPr>
@@ -540,10 +540,10 @@
           <a:lstStyle/>
           <a:p>
             <a:fld id="{2E6999B8-B6B4-4561-A3CD-BBCDAB9FC9D9}" type="slidenum">
-              <a:rPr lang="el-GR" smtClean="0"/>
+              <a:rPr lang="pt-BR" smtClean="0"/>
               <a:t>1</a:t>
             </a:fld>
-            <a:endParaRPr lang="el-GR"/>
+            <a:endParaRPr lang="pt-BR"/>
           </a:p>
         </p:txBody>
       </p:sp>
@@ -562,7 +562,7 @@
 
 <file path=ppt/slideLayouts/slideLayout1.xml><?xml version="1.0" encoding="utf-8"?>
 <p:sldLayout xmlns:a="http://schemas.openxmlformats.org/drawingml/2006/main" xmlns:r="http://schemas.openxmlformats.org/officeDocument/2006/relationships" xmlns:p="http://schemas.openxmlformats.org/presentationml/2006/main" type="title" preserve="1">
-  <p:cSld name="Διαφάνεια τίτλου">
+  <p:cSld name="Diapositivo de título">
     <p:spTree>
       <p:nvGrpSpPr>
         <p:cNvPr id="1" name=""/>
@@ -579,7 +579,7 @@
       </p:grpSpPr>
       <p:sp>
         <p:nvSpPr>
-          <p:cNvPr id="2" name="Τίτλος 1"/>
+          <p:cNvPr id="2" name="Título 1"/>
           <p:cNvSpPr>
             <a:spLocks noGrp="1"/>
           </p:cNvSpPr>
@@ -602,16 +602,16 @@
           </a:lstStyle>
           <a:p>
             <a:r>
-              <a:rPr lang="el-GR" smtClean="0"/>
-              <a:t>Στυλ κύριου τίτλου</a:t>
-            </a:r>
-            <a:endParaRPr lang="el-GR" dirty="0"/>
-          </a:p>
-        </p:txBody>
-      </p:sp>
-      <p:sp>
-        <p:nvSpPr>
-          <p:cNvPr id="3" name="Υπότιτλος 2"/>
+              <a:rPr lang="pt-BR" smtClean="0"/>
+              <a:t>Clique para editar o estilo</a:t>
+            </a:r>
+            <a:endParaRPr lang="pt-BR" dirty="0"/>
+          </a:p>
+        </p:txBody>
+      </p:sp>
+      <p:sp>
+        <p:nvSpPr>
+          <p:cNvPr id="3" name="Subtítulo 2"/>
           <p:cNvSpPr>
             <a:spLocks noGrp="1"/>
           </p:cNvSpPr>
@@ -667,16 +667,16 @@
           </a:lstStyle>
           <a:p>
             <a:r>
-              <a:rPr lang="el-GR" smtClean="0"/>
-              <a:t>Στυλ κύριου υπότιτλου</a:t>
-            </a:r>
-            <a:endParaRPr lang="el-GR" dirty="0"/>
-          </a:p>
-        </p:txBody>
-      </p:sp>
-      <p:sp>
-        <p:nvSpPr>
-          <p:cNvPr id="4" name="Θέση ημερομηνίας 3"/>
+              <a:rPr lang="pt-BR" smtClean="0"/>
+              <a:t>Faça clique para editar o estilo</a:t>
+            </a:r>
+            <a:endParaRPr lang="pt-BR" dirty="0"/>
+          </a:p>
+        </p:txBody>
+      </p:sp>
+      <p:sp>
+        <p:nvSpPr>
+          <p:cNvPr id="4" name="Marcador de Posição da Data 3"/>
           <p:cNvSpPr>
             <a:spLocks noGrp="1"/>
           </p:cNvSpPr>
@@ -690,16 +690,16 @@
           <a:lstStyle/>
           <a:p>
             <a:fld id="{BCC18F51-09EC-435C-A3BA-64A766E099C0}" type="datetimeFigureOut">
-              <a:rPr lang="el-GR" smtClean="0"/>
+              <a:rPr lang="pt-BR" smtClean="0"/>
               <a:t>30.10.2013</a:t>
             </a:fld>
-            <a:endParaRPr lang="el-GR"/>
-          </a:p>
-        </p:txBody>
-      </p:sp>
-      <p:sp>
-        <p:nvSpPr>
-          <p:cNvPr id="5" name="Θέση υποσέλιδου 4"/>
+            <a:endParaRPr lang="pt-BR"/>
+          </a:p>
+        </p:txBody>
+      </p:sp>
+      <p:sp>
+        <p:nvSpPr>
+          <p:cNvPr id="5" name="Marcador de Posição do Rodapé 4"/>
           <p:cNvSpPr>
             <a:spLocks noGrp="1"/>
           </p:cNvSpPr>
@@ -712,13 +712,13 @@
           <a:bodyPr/>
           <a:lstStyle/>
           <a:p>
-            <a:endParaRPr lang="el-GR"/>
-          </a:p>
-        </p:txBody>
-      </p:sp>
-      <p:sp>
-        <p:nvSpPr>
-          <p:cNvPr id="6" name="Θέση αριθμού διαφάνειας 5"/>
+            <a:endParaRPr lang="pt-BR"/>
+          </a:p>
+        </p:txBody>
+      </p:sp>
+      <p:sp>
+        <p:nvSpPr>
+          <p:cNvPr id="6" name="Marcador de Posição do Número do Diapositivo 5"/>
           <p:cNvSpPr>
             <a:spLocks noGrp="1"/>
           </p:cNvSpPr>
@@ -732,10 +732,10 @@
           <a:lstStyle/>
           <a:p>
             <a:fld id="{08395586-F03A-48D1-94DF-16B239DF4FB5}" type="slidenum">
-              <a:rPr lang="el-GR" smtClean="0"/>
+              <a:rPr lang="pt-BR" smtClean="0"/>
               <a:t>‹#›</a:t>
             </a:fld>
-            <a:endParaRPr lang="el-GR"/>
+            <a:endParaRPr lang="pt-BR"/>
           </a:p>
         </p:txBody>
       </p:sp>
@@ -754,7 +754,7 @@
 
 <file path=ppt/slideLayouts/slideLayout10.xml><?xml version="1.0" encoding="utf-8"?>
 <p:sldLayout xmlns:a="http://schemas.openxmlformats.org/drawingml/2006/main" xmlns:r="http://schemas.openxmlformats.org/officeDocument/2006/relationships" xmlns:p="http://schemas.openxmlformats.org/presentationml/2006/main" type="vertTx" preserve="1">
-  <p:cSld name="Τίτλος και Κατακόρυφο κείμενο">
+  <p:cSld name="Título e texto vertical">
     <p:spTree>
       <p:nvGrpSpPr>
         <p:cNvPr id="1" name=""/>
@@ -771,7 +771,7 @@
       </p:grpSpPr>
       <p:sp>
         <p:nvSpPr>
-          <p:cNvPr id="2" name="Τίτλος 1"/>
+          <p:cNvPr id="2" name="Título 1"/>
           <p:cNvSpPr>
             <a:spLocks noGrp="1"/>
           </p:cNvSpPr>
@@ -785,16 +785,16 @@
           <a:lstStyle/>
           <a:p>
             <a:r>
-              <a:rPr lang="el-GR" smtClean="0"/>
-              <a:t>Στυλ κύριου τίτλου</a:t>
-            </a:r>
-            <a:endParaRPr lang="el-GR" dirty="0"/>
-          </a:p>
-        </p:txBody>
-      </p:sp>
-      <p:sp>
-        <p:nvSpPr>
-          <p:cNvPr id="3" name="Θέση κατακόρυφου κειμένου 2"/>
+              <a:rPr lang="pt-BR" smtClean="0"/>
+              <a:t>Clique para editar o estilo</a:t>
+            </a:r>
+            <a:endParaRPr lang="pt-BR" dirty="0"/>
+          </a:p>
+        </p:txBody>
+      </p:sp>
+      <p:sp>
+        <p:nvSpPr>
+          <p:cNvPr id="3" name="Marcador de Posição de Texto Vertical 2"/>
           <p:cNvSpPr>
             <a:spLocks noGrp="1"/>
           </p:cNvSpPr>
@@ -809,44 +809,44 @@
           <a:p>
             <a:pPr lvl="0"/>
             <a:r>
-              <a:rPr lang="el-GR" smtClean="0"/>
-              <a:t>Στυλ υποδείγματος κειμένου</a:t>
+              <a:rPr lang="pt-BR" smtClean="0"/>
+              <a:t>Clique para editar os estilos</a:t>
             </a:r>
           </a:p>
           <a:p>
             <a:pPr lvl="1"/>
             <a:r>
-              <a:rPr lang="el-GR" smtClean="0"/>
-              <a:t>Δεύτερου επιπέδου</a:t>
+              <a:rPr lang="pt-BR" smtClean="0"/>
+              <a:t>Segundo nível</a:t>
             </a:r>
           </a:p>
           <a:p>
             <a:pPr lvl="2"/>
             <a:r>
-              <a:rPr lang="el-GR" smtClean="0"/>
-              <a:t>Τρίτου επιπέδου</a:t>
+              <a:rPr lang="pt-BR" smtClean="0"/>
+              <a:t>Terceiro nível</a:t>
             </a:r>
           </a:p>
           <a:p>
             <a:pPr lvl="3"/>
             <a:r>
-              <a:rPr lang="el-GR" smtClean="0"/>
-              <a:t>Τέταρτου επιπέδου</a:t>
+              <a:rPr lang="pt-BR" smtClean="0"/>
+              <a:t>Quarto nível</a:t>
             </a:r>
           </a:p>
           <a:p>
             <a:pPr lvl="4"/>
             <a:r>
-              <a:rPr lang="el-GR" smtClean="0"/>
-              <a:t>Πέμπτου επιπέδου</a:t>
-            </a:r>
-            <a:endParaRPr lang="el-GR" dirty="0"/>
-          </a:p>
-        </p:txBody>
-      </p:sp>
-      <p:sp>
-        <p:nvSpPr>
-          <p:cNvPr id="4" name="Θέση ημερομηνίας 3"/>
+              <a:rPr lang="pt-BR" smtClean="0"/>
+              <a:t>Quinto nível</a:t>
+            </a:r>
+            <a:endParaRPr lang="pt-BR" dirty="0"/>
+          </a:p>
+        </p:txBody>
+      </p:sp>
+      <p:sp>
+        <p:nvSpPr>
+          <p:cNvPr id="4" name="Marcador de Posição da Data 3"/>
           <p:cNvSpPr>
             <a:spLocks noGrp="1"/>
           </p:cNvSpPr>
@@ -860,16 +860,16 @@
           <a:lstStyle/>
           <a:p>
             <a:fld id="{BCC18F51-09EC-435C-A3BA-64A766E099C0}" type="datetimeFigureOut">
-              <a:rPr lang="el-GR" smtClean="0"/>
+              <a:rPr lang="pt-BR" smtClean="0"/>
               <a:t>30.10.2013</a:t>
             </a:fld>
-            <a:endParaRPr lang="el-GR"/>
-          </a:p>
-        </p:txBody>
-      </p:sp>
-      <p:sp>
-        <p:nvSpPr>
-          <p:cNvPr id="5" name="Θέση υποσέλιδου 4"/>
+            <a:endParaRPr lang="pt-BR"/>
+          </a:p>
+        </p:txBody>
+      </p:sp>
+      <p:sp>
+        <p:nvSpPr>
+          <p:cNvPr id="5" name="Marcador de Posição do Rodapé 4"/>
           <p:cNvSpPr>
             <a:spLocks noGrp="1"/>
           </p:cNvSpPr>
@@ -882,13 +882,13 @@
           <a:bodyPr/>
           <a:lstStyle/>
           <a:p>
-            <a:endParaRPr lang="el-GR"/>
-          </a:p>
-        </p:txBody>
-      </p:sp>
-      <p:sp>
-        <p:nvSpPr>
-          <p:cNvPr id="6" name="Θέση αριθμού διαφάνειας 5"/>
+            <a:endParaRPr lang="pt-BR"/>
+          </a:p>
+        </p:txBody>
+      </p:sp>
+      <p:sp>
+        <p:nvSpPr>
+          <p:cNvPr id="6" name="Marcador de Posição do Número do Diapositivo 5"/>
           <p:cNvSpPr>
             <a:spLocks noGrp="1"/>
           </p:cNvSpPr>
@@ -902,10 +902,10 @@
           <a:lstStyle/>
           <a:p>
             <a:fld id="{08395586-F03A-48D1-94DF-16B239DF4FB5}" type="slidenum">
-              <a:rPr lang="el-GR" smtClean="0"/>
+              <a:rPr lang="pt-BR" smtClean="0"/>
               <a:t>‹#›</a:t>
             </a:fld>
-            <a:endParaRPr lang="el-GR"/>
+            <a:endParaRPr lang="pt-BR"/>
           </a:p>
         </p:txBody>
       </p:sp>
@@ -924,7 +924,7 @@
 
 <file path=ppt/slideLayouts/slideLayout11.xml><?xml version="1.0" encoding="utf-8"?>
 <p:sldLayout xmlns:a="http://schemas.openxmlformats.org/drawingml/2006/main" xmlns:r="http://schemas.openxmlformats.org/officeDocument/2006/relationships" xmlns:p="http://schemas.openxmlformats.org/presentationml/2006/main" type="vertTitleAndTx" preserve="1">
-  <p:cSld name="Κατακόρυφος τίτλος και Κείμενο">
+  <p:cSld name="Título vertical e texto">
     <p:spTree>
       <p:nvGrpSpPr>
         <p:cNvPr id="1" name=""/>
@@ -941,7 +941,7 @@
       </p:grpSpPr>
       <p:sp>
         <p:nvSpPr>
-          <p:cNvPr id="2" name="Κατακόρυφος τίτλος 1"/>
+          <p:cNvPr id="2" name="Título Vertical 1"/>
           <p:cNvSpPr>
             <a:spLocks noGrp="1"/>
           </p:cNvSpPr>
@@ -960,16 +960,16 @@
           <a:lstStyle/>
           <a:p>
             <a:r>
-              <a:rPr lang="el-GR" smtClean="0"/>
-              <a:t>Στυλ κύριου τίτλου</a:t>
-            </a:r>
-            <a:endParaRPr lang="el-GR" dirty="0"/>
-          </a:p>
-        </p:txBody>
-      </p:sp>
-      <p:sp>
-        <p:nvSpPr>
-          <p:cNvPr id="3" name="Θέση κατακόρυφου κειμένου 2"/>
+              <a:rPr lang="pt-BR" smtClean="0"/>
+              <a:t>Clique para editar o estilo</a:t>
+            </a:r>
+            <a:endParaRPr lang="pt-BR" dirty="0"/>
+          </a:p>
+        </p:txBody>
+      </p:sp>
+      <p:sp>
+        <p:nvSpPr>
+          <p:cNvPr id="3" name="Marcador de Posição de Texto Vertical 2"/>
           <p:cNvSpPr>
             <a:spLocks noGrp="1"/>
           </p:cNvSpPr>
@@ -989,44 +989,44 @@
           <a:p>
             <a:pPr lvl="0"/>
             <a:r>
-              <a:rPr lang="el-GR" smtClean="0"/>
-              <a:t>Στυλ υποδείγματος κειμένου</a:t>
+              <a:rPr lang="pt-BR" smtClean="0"/>
+              <a:t>Clique para editar os estilos</a:t>
             </a:r>
           </a:p>
           <a:p>
             <a:pPr lvl="1"/>
             <a:r>
-              <a:rPr lang="el-GR" smtClean="0"/>
-              <a:t>Δεύτερου επιπέδου</a:t>
+              <a:rPr lang="pt-BR" smtClean="0"/>
+              <a:t>Segundo nível</a:t>
             </a:r>
           </a:p>
           <a:p>
             <a:pPr lvl="2"/>
             <a:r>
-              <a:rPr lang="el-GR" smtClean="0"/>
-              <a:t>Τρίτου επιπέδου</a:t>
+              <a:rPr lang="pt-BR" smtClean="0"/>
+              <a:t>Terceiro nível</a:t>
             </a:r>
           </a:p>
           <a:p>
             <a:pPr lvl="3"/>
             <a:r>
-              <a:rPr lang="el-GR" smtClean="0"/>
-              <a:t>Τέταρτου επιπέδου</a:t>
+              <a:rPr lang="pt-BR" smtClean="0"/>
+              <a:t>Quarto nível</a:t>
             </a:r>
           </a:p>
           <a:p>
             <a:pPr lvl="4"/>
             <a:r>
-              <a:rPr lang="el-GR" smtClean="0"/>
-              <a:t>Πέμπτου επιπέδου</a:t>
-            </a:r>
-            <a:endParaRPr lang="el-GR" dirty="0"/>
-          </a:p>
-        </p:txBody>
-      </p:sp>
-      <p:sp>
-        <p:nvSpPr>
-          <p:cNvPr id="4" name="Θέση ημερομηνίας 3"/>
+              <a:rPr lang="pt-BR" smtClean="0"/>
+              <a:t>Quinto nível</a:t>
+            </a:r>
+            <a:endParaRPr lang="pt-BR" dirty="0"/>
+          </a:p>
+        </p:txBody>
+      </p:sp>
+      <p:sp>
+        <p:nvSpPr>
+          <p:cNvPr id="4" name="Marcador de Posição da Data 3"/>
           <p:cNvSpPr>
             <a:spLocks noGrp="1"/>
           </p:cNvSpPr>
@@ -1040,16 +1040,16 @@
           <a:lstStyle/>
           <a:p>
             <a:fld id="{BCC18F51-09EC-435C-A3BA-64A766E099C0}" type="datetimeFigureOut">
-              <a:rPr lang="el-GR" smtClean="0"/>
+              <a:rPr lang="pt-BR" smtClean="0"/>
               <a:t>30.10.2013</a:t>
             </a:fld>
-            <a:endParaRPr lang="el-GR"/>
-          </a:p>
-        </p:txBody>
-      </p:sp>
-      <p:sp>
-        <p:nvSpPr>
-          <p:cNvPr id="5" name="Θέση υποσέλιδου 4"/>
+            <a:endParaRPr lang="pt-BR"/>
+          </a:p>
+        </p:txBody>
+      </p:sp>
+      <p:sp>
+        <p:nvSpPr>
+          <p:cNvPr id="5" name="Marcador de Posição do Rodapé 4"/>
           <p:cNvSpPr>
             <a:spLocks noGrp="1"/>
           </p:cNvSpPr>
@@ -1062,13 +1062,13 @@
           <a:bodyPr/>
           <a:lstStyle/>
           <a:p>
-            <a:endParaRPr lang="el-GR"/>
-          </a:p>
-        </p:txBody>
-      </p:sp>
-      <p:sp>
-        <p:nvSpPr>
-          <p:cNvPr id="6" name="Θέση αριθμού διαφάνειας 5"/>
+            <a:endParaRPr lang="pt-BR"/>
+          </a:p>
+        </p:txBody>
+      </p:sp>
+      <p:sp>
+        <p:nvSpPr>
+          <p:cNvPr id="6" name="Marcador de Posição do Número do Diapositivo 5"/>
           <p:cNvSpPr>
             <a:spLocks noGrp="1"/>
           </p:cNvSpPr>
@@ -1082,10 +1082,10 @@
           <a:lstStyle/>
           <a:p>
             <a:fld id="{08395586-F03A-48D1-94DF-16B239DF4FB5}" type="slidenum">
-              <a:rPr lang="el-GR" smtClean="0"/>
+              <a:rPr lang="pt-BR" smtClean="0"/>
               <a:t>‹#›</a:t>
             </a:fld>
-            <a:endParaRPr lang="el-GR"/>
+            <a:endParaRPr lang="pt-BR"/>
           </a:p>
         </p:txBody>
       </p:sp>
@@ -1104,7 +1104,7 @@
 
 <file path=ppt/slideLayouts/slideLayout2.xml><?xml version="1.0" encoding="utf-8"?>
 <p:sldLayout xmlns:a="http://schemas.openxmlformats.org/drawingml/2006/main" xmlns:r="http://schemas.openxmlformats.org/officeDocument/2006/relationships" xmlns:p="http://schemas.openxmlformats.org/presentationml/2006/main" type="obj" preserve="1">
-  <p:cSld name="Τίτλος και Περιεχόμενο">
+  <p:cSld name="Título e objecto">
     <p:spTree>
       <p:nvGrpSpPr>
         <p:cNvPr id="1" name=""/>
@@ -1121,7 +1121,7 @@
       </p:grpSpPr>
       <p:sp>
         <p:nvSpPr>
-          <p:cNvPr id="2" name="Τίτλος 1"/>
+          <p:cNvPr id="2" name="Título 1"/>
           <p:cNvSpPr>
             <a:spLocks noGrp="1"/>
           </p:cNvSpPr>
@@ -1135,16 +1135,16 @@
           <a:lstStyle/>
           <a:p>
             <a:r>
-              <a:rPr lang="el-GR" smtClean="0"/>
-              <a:t>Στυλ κύριου τίτλου</a:t>
-            </a:r>
-            <a:endParaRPr lang="el-GR" dirty="0"/>
-          </a:p>
-        </p:txBody>
-      </p:sp>
-      <p:sp>
-        <p:nvSpPr>
-          <p:cNvPr id="3" name="Θέση περιεχομένου 2"/>
+              <a:rPr lang="pt-BR" smtClean="0"/>
+              <a:t>Clique para editar o estilo</a:t>
+            </a:r>
+            <a:endParaRPr lang="pt-BR" dirty="0"/>
+          </a:p>
+        </p:txBody>
+      </p:sp>
+      <p:sp>
+        <p:nvSpPr>
+          <p:cNvPr id="3" name="Marcador de Posição de Conteúdo 2"/>
           <p:cNvSpPr>
             <a:spLocks noGrp="1"/>
           </p:cNvSpPr>
@@ -1159,44 +1159,44 @@
           <a:p>
             <a:pPr lvl="0"/>
             <a:r>
-              <a:rPr lang="el-GR" smtClean="0"/>
-              <a:t>Στυλ υποδείγματος κειμένου</a:t>
+              <a:rPr lang="pt-BR" smtClean="0"/>
+              <a:t>Clique para editar os estilos</a:t>
             </a:r>
           </a:p>
           <a:p>
             <a:pPr lvl="1"/>
             <a:r>
-              <a:rPr lang="el-GR" smtClean="0"/>
-              <a:t>Δεύτερου επιπέδου</a:t>
+              <a:rPr lang="pt-BR" smtClean="0"/>
+              <a:t>Segundo nível</a:t>
             </a:r>
           </a:p>
           <a:p>
             <a:pPr lvl="2"/>
             <a:r>
-              <a:rPr lang="el-GR" smtClean="0"/>
-              <a:t>Τρίτου επιπέδου</a:t>
+              <a:rPr lang="pt-BR" smtClean="0"/>
+              <a:t>Terceiro nível</a:t>
             </a:r>
           </a:p>
           <a:p>
             <a:pPr lvl="3"/>
             <a:r>
-              <a:rPr lang="el-GR" smtClean="0"/>
-              <a:t>Τέταρτου επιπέδου</a:t>
+              <a:rPr lang="pt-BR" smtClean="0"/>
+              <a:t>Quarto nível</a:t>
             </a:r>
           </a:p>
           <a:p>
             <a:pPr lvl="4"/>
             <a:r>
-              <a:rPr lang="el-GR" smtClean="0"/>
-              <a:t>Πέμπτου επιπέδου</a:t>
-            </a:r>
-            <a:endParaRPr lang="el-GR" dirty="0"/>
-          </a:p>
-        </p:txBody>
-      </p:sp>
-      <p:sp>
-        <p:nvSpPr>
-          <p:cNvPr id="4" name="Θέση ημερομηνίας 3"/>
+              <a:rPr lang="pt-BR" smtClean="0"/>
+              <a:t>Quinto nível</a:t>
+            </a:r>
+            <a:endParaRPr lang="pt-BR" dirty="0"/>
+          </a:p>
+        </p:txBody>
+      </p:sp>
+      <p:sp>
+        <p:nvSpPr>
+          <p:cNvPr id="4" name="Marcador de Posição da Data 3"/>
           <p:cNvSpPr>
             <a:spLocks noGrp="1"/>
           </p:cNvSpPr>
@@ -1210,16 +1210,16 @@
           <a:lstStyle/>
           <a:p>
             <a:fld id="{BCC18F51-09EC-435C-A3BA-64A766E099C0}" type="datetimeFigureOut">
-              <a:rPr lang="el-GR" smtClean="0"/>
+              <a:rPr lang="pt-BR" smtClean="0"/>
               <a:t>30.10.2013</a:t>
             </a:fld>
-            <a:endParaRPr lang="el-GR"/>
-          </a:p>
-        </p:txBody>
-      </p:sp>
-      <p:sp>
-        <p:nvSpPr>
-          <p:cNvPr id="5" name="Θέση υποσέλιδου 4"/>
+            <a:endParaRPr lang="pt-BR"/>
+          </a:p>
+        </p:txBody>
+      </p:sp>
+      <p:sp>
+        <p:nvSpPr>
+          <p:cNvPr id="5" name="Marcador de Posição do Rodapé 4"/>
           <p:cNvSpPr>
             <a:spLocks noGrp="1"/>
           </p:cNvSpPr>
@@ -1232,13 +1232,13 @@
           <a:bodyPr/>
           <a:lstStyle/>
           <a:p>
-            <a:endParaRPr lang="el-GR"/>
-          </a:p>
-        </p:txBody>
-      </p:sp>
-      <p:sp>
-        <p:nvSpPr>
-          <p:cNvPr id="6" name="Θέση αριθμού διαφάνειας 5"/>
+            <a:endParaRPr lang="pt-BR"/>
+          </a:p>
+        </p:txBody>
+      </p:sp>
+      <p:sp>
+        <p:nvSpPr>
+          <p:cNvPr id="6" name="Marcador de Posição do Número do Diapositivo 5"/>
           <p:cNvSpPr>
             <a:spLocks noGrp="1"/>
           </p:cNvSpPr>
@@ -1252,10 +1252,10 @@
           <a:lstStyle/>
           <a:p>
             <a:fld id="{08395586-F03A-48D1-94DF-16B239DF4FB5}" type="slidenum">
-              <a:rPr lang="el-GR" smtClean="0"/>
+              <a:rPr lang="pt-BR" smtClean="0"/>
               <a:t>‹#›</a:t>
             </a:fld>
-            <a:endParaRPr lang="el-GR"/>
+            <a:endParaRPr lang="pt-BR"/>
           </a:p>
         </p:txBody>
       </p:sp>
@@ -1274,7 +1274,7 @@
 
 <file path=ppt/slideLayouts/slideLayout3.xml><?xml version="1.0" encoding="utf-8"?>
 <p:sldLayout xmlns:a="http://schemas.openxmlformats.org/drawingml/2006/main" xmlns:r="http://schemas.openxmlformats.org/officeDocument/2006/relationships" xmlns:p="http://schemas.openxmlformats.org/presentationml/2006/main" type="secHead" preserve="1">
-  <p:cSld name="Κεφαλίδα ενότητας">
+  <p:cSld name="Cabeçalho da Secção">
     <p:spTree>
       <p:nvGrpSpPr>
         <p:cNvPr id="1" name=""/>
@@ -1291,7 +1291,7 @@
       </p:grpSpPr>
       <p:sp>
         <p:nvSpPr>
-          <p:cNvPr id="2" name="Τίτλος 1"/>
+          <p:cNvPr id="2" name="Título 1"/>
           <p:cNvSpPr>
             <a:spLocks noGrp="1"/>
           </p:cNvSpPr>
@@ -1314,16 +1314,16 @@
           </a:lstStyle>
           <a:p>
             <a:r>
-              <a:rPr lang="el-GR" smtClean="0"/>
-              <a:t>Στυλ κύριου τίτλου</a:t>
-            </a:r>
-            <a:endParaRPr lang="el-GR" dirty="0"/>
-          </a:p>
-        </p:txBody>
-      </p:sp>
-      <p:sp>
-        <p:nvSpPr>
-          <p:cNvPr id="3" name="Θέση κειμένου 2"/>
+              <a:rPr lang="pt-BR" smtClean="0"/>
+              <a:t>Clique para editar o estilo</a:t>
+            </a:r>
+            <a:endParaRPr lang="pt-BR" dirty="0"/>
+          </a:p>
+        </p:txBody>
+      </p:sp>
+      <p:sp>
+        <p:nvSpPr>
+          <p:cNvPr id="3" name="Marcador de Posição do Texto 2"/>
           <p:cNvSpPr>
             <a:spLocks noGrp="1"/>
           </p:cNvSpPr>
@@ -1434,15 +1434,15 @@
           <a:p>
             <a:pPr lvl="0"/>
             <a:r>
-              <a:rPr lang="el-GR" smtClean="0"/>
-              <a:t>Στυλ υποδείγματος κειμένου</a:t>
-            </a:r>
-          </a:p>
-        </p:txBody>
-      </p:sp>
-      <p:sp>
-        <p:nvSpPr>
-          <p:cNvPr id="4" name="Θέση ημερομηνίας 3"/>
+              <a:rPr lang="pt-BR" smtClean="0"/>
+              <a:t>Clique para editar os estilos</a:t>
+            </a:r>
+          </a:p>
+        </p:txBody>
+      </p:sp>
+      <p:sp>
+        <p:nvSpPr>
+          <p:cNvPr id="4" name="Marcador de Posição da Data 3"/>
           <p:cNvSpPr>
             <a:spLocks noGrp="1"/>
           </p:cNvSpPr>
@@ -1456,16 +1456,16 @@
           <a:lstStyle/>
           <a:p>
             <a:fld id="{BCC18F51-09EC-435C-A3BA-64A766E099C0}" type="datetimeFigureOut">
-              <a:rPr lang="el-GR" smtClean="0"/>
+              <a:rPr lang="pt-BR" smtClean="0"/>
               <a:t>30.10.2013</a:t>
             </a:fld>
-            <a:endParaRPr lang="el-GR"/>
-          </a:p>
-        </p:txBody>
-      </p:sp>
-      <p:sp>
-        <p:nvSpPr>
-          <p:cNvPr id="5" name="Θέση υποσέλιδου 4"/>
+            <a:endParaRPr lang="pt-BR"/>
+          </a:p>
+        </p:txBody>
+      </p:sp>
+      <p:sp>
+        <p:nvSpPr>
+          <p:cNvPr id="5" name="Marcador de Posição do Rodapé 4"/>
           <p:cNvSpPr>
             <a:spLocks noGrp="1"/>
           </p:cNvSpPr>
@@ -1478,13 +1478,13 @@
           <a:bodyPr/>
           <a:lstStyle/>
           <a:p>
-            <a:endParaRPr lang="el-GR"/>
-          </a:p>
-        </p:txBody>
-      </p:sp>
-      <p:sp>
-        <p:nvSpPr>
-          <p:cNvPr id="6" name="Θέση αριθμού διαφάνειας 5"/>
+            <a:endParaRPr lang="pt-BR"/>
+          </a:p>
+        </p:txBody>
+      </p:sp>
+      <p:sp>
+        <p:nvSpPr>
+          <p:cNvPr id="6" name="Marcador de Posição do Número do Diapositivo 5"/>
           <p:cNvSpPr>
             <a:spLocks noGrp="1"/>
           </p:cNvSpPr>
@@ -1498,10 +1498,10 @@
           <a:lstStyle/>
           <a:p>
             <a:fld id="{08395586-F03A-48D1-94DF-16B239DF4FB5}" type="slidenum">
-              <a:rPr lang="el-GR" smtClean="0"/>
+              <a:rPr lang="pt-BR" smtClean="0"/>
               <a:t>‹#›</a:t>
             </a:fld>
-            <a:endParaRPr lang="el-GR"/>
+            <a:endParaRPr lang="pt-BR"/>
           </a:p>
         </p:txBody>
       </p:sp>
@@ -1520,7 +1520,7 @@
 
 <file path=ppt/slideLayouts/slideLayout4.xml><?xml version="1.0" encoding="utf-8"?>
 <p:sldLayout xmlns:a="http://schemas.openxmlformats.org/drawingml/2006/main" xmlns:r="http://schemas.openxmlformats.org/officeDocument/2006/relationships" xmlns:p="http://schemas.openxmlformats.org/presentationml/2006/main" type="twoObj" preserve="1">
-  <p:cSld name="Δύο περιεχόμενα">
+  <p:cSld name="Conteúdo Duplo">
     <p:spTree>
       <p:nvGrpSpPr>
         <p:cNvPr id="1" name=""/>
@@ -1537,7 +1537,7 @@
       </p:grpSpPr>
       <p:sp>
         <p:nvSpPr>
-          <p:cNvPr id="2" name="Τίτλος 1"/>
+          <p:cNvPr id="2" name="Título 1"/>
           <p:cNvSpPr>
             <a:spLocks noGrp="1"/>
           </p:cNvSpPr>
@@ -1551,16 +1551,16 @@
           <a:lstStyle/>
           <a:p>
             <a:r>
-              <a:rPr lang="el-GR" smtClean="0"/>
-              <a:t>Στυλ κύριου τίτλου</a:t>
-            </a:r>
-            <a:endParaRPr lang="el-GR" dirty="0"/>
-          </a:p>
-        </p:txBody>
-      </p:sp>
-      <p:sp>
-        <p:nvSpPr>
-          <p:cNvPr id="3" name="Θέση περιεχομένου 2"/>
+              <a:rPr lang="pt-BR" smtClean="0"/>
+              <a:t>Clique para editar o estilo</a:t>
+            </a:r>
+            <a:endParaRPr lang="pt-BR" dirty="0"/>
+          </a:p>
+        </p:txBody>
+      </p:sp>
+      <p:sp>
+        <p:nvSpPr>
+          <p:cNvPr id="3" name="Marcador de Posição de Conteúdo 2"/>
           <p:cNvSpPr>
             <a:spLocks noGrp="1"/>
           </p:cNvSpPr>
@@ -1580,43 +1580,44 @@
           <a:p>
             <a:pPr lvl="0"/>
             <a:r>
-              <a:rPr lang="el-GR" smtClean="0"/>
-              <a:t>Στυλ υποδείγματος κειμένου</a:t>
+              <a:rPr lang="pt-BR" smtClean="0"/>
+              <a:t>Clique para editar os estilos</a:t>
             </a:r>
           </a:p>
           <a:p>
             <a:pPr lvl="1"/>
             <a:r>
-              <a:rPr lang="el-GR" smtClean="0"/>
-              <a:t>Δεύτερου επιπέδου</a:t>
+              <a:rPr lang="pt-BR" smtClean="0"/>
+              <a:t>Segundo nível</a:t>
             </a:r>
           </a:p>
           <a:p>
             <a:pPr lvl="2"/>
             <a:r>
-              <a:rPr lang="el-GR" smtClean="0"/>
-              <a:t>Τρίτου επιπέδου</a:t>
+              <a:rPr lang="pt-BR" smtClean="0"/>
+              <a:t>Terceiro nível</a:t>
             </a:r>
           </a:p>
           <a:p>
             <a:pPr lvl="3"/>
             <a:r>
-              <a:rPr lang="el-GR" smtClean="0"/>
-              <a:t>Τέταρτου επιπέδου</a:t>
+              <a:rPr lang="pt-BR" smtClean="0"/>
+              <a:t>Quarto nível</a:t>
             </a:r>
           </a:p>
           <a:p>
             <a:pPr lvl="4"/>
             <a:r>
-              <a:rPr lang="el-GR" smtClean="0"/>
-              <a:t>Πέμπτου επιπέδου</a:t>
-            </a:r>
-            <a:endParaRPr lang="el-GR" dirty="0"/>
-          </a:p>
-        </p:txBody>
-      </p:sp>
-      <p:sp>
-        <p:nvSpPr>
+              <a:rPr lang="pt-BR" smtClean="0"/>
+              <a:t>Quinto nível</a:t>
+            </a:r>
+            <a:endParaRPr lang="pt-BR" dirty="0"/>
+          </a:p>
+        </p:txBody>
+      </p:sp>
+      <p:sp>
+        <p:nvSpPr>
+          <p:cNvPr id="4" name="Marcador de Posição de Conteúdo 3"/>
           <p:cNvSpPr>
             <a:spLocks noGrp="1"/>
           </p:cNvSpPr>
@@ -1636,44 +1637,44 @@
           <a:p>
             <a:pPr lvl="0"/>
             <a:r>
-              <a:rPr lang="el-GR" smtClean="0"/>
-              <a:t>Στυλ υποδείγματος κειμένου</a:t>
+              <a:rPr lang="pt-BR" smtClean="0"/>
+              <a:t>Clique para editar os estilos</a:t>
             </a:r>
           </a:p>
           <a:p>
             <a:pPr lvl="1"/>
             <a:r>
-              <a:rPr lang="el-GR" smtClean="0"/>
-              <a:t>Δεύτερου επιπέδου</a:t>
+              <a:rPr lang="pt-BR" smtClean="0"/>
+              <a:t>Segundo nível</a:t>
             </a:r>
           </a:p>
           <a:p>
             <a:pPr lvl="2"/>
             <a:r>
-              <a:rPr lang="el-GR" smtClean="0"/>
-              <a:t>Τρίτου επιπέδου</a:t>
+              <a:rPr lang="pt-BR" smtClean="0"/>
+              <a:t>Terceiro nível</a:t>
             </a:r>
           </a:p>
           <a:p>
             <a:pPr lvl="3"/>
             <a:r>
-              <a:rPr lang="el-GR" smtClean="0"/>
-              <a:t>Τέταρτου επιπέδου</a:t>
+              <a:rPr lang="pt-BR" smtClean="0"/>
+              <a:t>Quarto nível</a:t>
             </a:r>
           </a:p>
           <a:p>
             <a:pPr lvl="4"/>
             <a:r>
-              <a:rPr lang="el-GR" smtClean="0"/>
-              <a:t>Πέμπτου επιπέδου</a:t>
-            </a:r>
-            <a:endParaRPr lang="el-GR" dirty="0"/>
-          </a:p>
-        </p:txBody>
-      </p:sp>
-      <p:sp>
-        <p:nvSpPr>
-          <p:cNvPr id="5" name="Θέση ημερομηνίας 4"/>
+              <a:rPr lang="pt-BR" smtClean="0"/>
+              <a:t>Quinto nível</a:t>
+            </a:r>
+            <a:endParaRPr lang="pt-BR" dirty="0"/>
+          </a:p>
+        </p:txBody>
+      </p:sp>
+      <p:sp>
+        <p:nvSpPr>
+          <p:cNvPr id="5" name="Marcador de Posição da Data 4"/>
           <p:cNvSpPr>
             <a:spLocks noGrp="1"/>
           </p:cNvSpPr>
@@ -1687,16 +1688,16 @@
           <a:lstStyle/>
           <a:p>
             <a:fld id="{BCC18F51-09EC-435C-A3BA-64A766E099C0}" type="datetimeFigureOut">
-              <a:rPr lang="el-GR" smtClean="0"/>
+              <a:rPr lang="pt-BR" smtClean="0"/>
               <a:t>30.10.2013</a:t>
             </a:fld>
-            <a:endParaRPr lang="el-GR"/>
-          </a:p>
-        </p:txBody>
-      </p:sp>
-      <p:sp>
-        <p:nvSpPr>
-          <p:cNvPr id="6" name="Θέση υποσέλιδου 5"/>
+            <a:endParaRPr lang="pt-BR"/>
+          </a:p>
+        </p:txBody>
+      </p:sp>
+      <p:sp>
+        <p:nvSpPr>
+          <p:cNvPr id="6" name="Marcador de Posição do Rodapé 5"/>
           <p:cNvSpPr>
             <a:spLocks noGrp="1"/>
           </p:cNvSpPr>
@@ -1709,13 +1710,13 @@
           <a:bodyPr/>
           <a:lstStyle/>
           <a:p>
-            <a:endParaRPr lang="el-GR"/>
-          </a:p>
-        </p:txBody>
-      </p:sp>
-      <p:sp>
-        <p:nvSpPr>
-          <p:cNvPr id="7" name="Θέση αριθμού διαφάνειας 6"/>
+            <a:endParaRPr lang="pt-BR"/>
+          </a:p>
+        </p:txBody>
+      </p:sp>
+      <p:sp>
+        <p:nvSpPr>
+          <p:cNvPr id="7" name="Marcador de Posição do Número do Diapositivo 6"/>
           <p:cNvSpPr>
             <a:spLocks noGrp="1"/>
           </p:cNvSpPr>
@@ -1729,10 +1730,10 @@
           <a:lstStyle/>
           <a:p>
             <a:fld id="{08395586-F03A-48D1-94DF-16B239DF4FB5}" type="slidenum">
-              <a:rPr lang="el-GR" smtClean="0"/>
+              <a:rPr lang="pt-BR" smtClean="0"/>
               <a:t>‹#›</a:t>
             </a:fld>
-            <a:endParaRPr lang="el-GR"/>
+            <a:endParaRPr lang="pt-BR"/>
           </a:p>
         </p:txBody>
       </p:sp>
@@ -1751,7 +1752,7 @@
 
 <file path=ppt/slideLayouts/slideLayout5.xml><?xml version="1.0" encoding="utf-8"?>
 <p:sldLayout xmlns:a="http://schemas.openxmlformats.org/drawingml/2006/main" xmlns:r="http://schemas.openxmlformats.org/officeDocument/2006/relationships" xmlns:p="http://schemas.openxmlformats.org/presentationml/2006/main" type="twoTxTwoObj" preserve="1">
-  <p:cSld name="Σύγκριση">
+  <p:cSld name="Comparação">
     <p:spTree>
       <p:nvGrpSpPr>
         <p:cNvPr id="1" name=""/>
@@ -1768,7 +1769,7 @@
       </p:grpSpPr>
       <p:sp>
         <p:nvSpPr>
-          <p:cNvPr id="2" name="Τίτλος 1"/>
+          <p:cNvPr id="2" name="Título 1"/>
           <p:cNvSpPr>
             <a:spLocks noGrp="1"/>
           </p:cNvSpPr>
@@ -1787,16 +1788,16 @@
           <a:lstStyle/>
           <a:p>
             <a:r>
-              <a:rPr lang="el-GR" smtClean="0"/>
-              <a:t>Στυλ κύριου τίτλου</a:t>
-            </a:r>
-            <a:endParaRPr lang="el-GR" dirty="0"/>
-          </a:p>
-        </p:txBody>
-      </p:sp>
-      <p:sp>
-        <p:nvSpPr>
-          <p:cNvPr id="3" name="Θέση κειμένου 2"/>
+              <a:rPr lang="pt-BR" smtClean="0"/>
+              <a:t>Clique para editar o estilo</a:t>
+            </a:r>
+            <a:endParaRPr lang="pt-BR" dirty="0"/>
+          </a:p>
+        </p:txBody>
+      </p:sp>
+      <p:sp>
+        <p:nvSpPr>
+          <p:cNvPr id="3" name="Marcador de Posição do Texto 2"/>
           <p:cNvSpPr>
             <a:spLocks noGrp="1"/>
           </p:cNvSpPr>
@@ -1853,15 +1854,15 @@
           <a:p>
             <a:pPr lvl="0"/>
             <a:r>
-              <a:rPr lang="el-GR" smtClean="0"/>
-              <a:t>Στυλ υποδείγματος κειμένου</a:t>
-            </a:r>
-          </a:p>
-        </p:txBody>
-      </p:sp>
-      <p:sp>
-        <p:nvSpPr>
-          <p:cNvPr id="4" name="Θέση περιεχομένου 3"/>
+              <a:rPr lang="pt-BR" smtClean="0"/>
+              <a:t>Clique para editar os estilos</a:t>
+            </a:r>
+          </a:p>
+        </p:txBody>
+      </p:sp>
+      <p:sp>
+        <p:nvSpPr>
+          <p:cNvPr id="4" name="Marcador de Posição de Conteúdo 3"/>
           <p:cNvSpPr>
             <a:spLocks noGrp="1"/>
           </p:cNvSpPr>
@@ -1881,44 +1882,44 @@
           <a:p>
             <a:pPr lvl="0"/>
             <a:r>
-              <a:rPr lang="el-GR" smtClean="0"/>
-              <a:t>Στυλ υποδείγματος κειμένου</a:t>
+              <a:rPr lang="pt-BR" smtClean="0"/>
+              <a:t>Clique para editar os estilos</a:t>
             </a:r>
           </a:p>
           <a:p>
             <a:pPr lvl="1"/>
             <a:r>
-              <a:rPr lang="el-GR" smtClean="0"/>
-              <a:t>Δεύτερου επιπέδου</a:t>
+              <a:rPr lang="pt-BR" smtClean="0"/>
+              <a:t>Segundo nível</a:t>
             </a:r>
           </a:p>
           <a:p>
             <a:pPr lvl="2"/>
             <a:r>
-              <a:rPr lang="el-GR" smtClean="0"/>
-              <a:t>Τρίτου επιπέδου</a:t>
+              <a:rPr lang="pt-BR" smtClean="0"/>
+              <a:t>Terceiro nível</a:t>
             </a:r>
           </a:p>
           <a:p>
             <a:pPr lvl="3"/>
             <a:r>
-              <a:rPr lang="el-GR" smtClean="0"/>
-              <a:t>Τέταρτου επιπέδου</a:t>
+              <a:rPr lang="pt-BR" smtClean="0"/>
+              <a:t>Quarto nível</a:t>
             </a:r>
           </a:p>
           <a:p>
             <a:pPr lvl="4"/>
             <a:r>
-              <a:rPr lang="el-GR" smtClean="0"/>
-              <a:t>Πέμπτου επιπέδου</a:t>
-            </a:r>
-            <a:endParaRPr lang="el-GR" dirty="0"/>
-          </a:p>
-        </p:txBody>
-      </p:sp>
-      <p:sp>
-        <p:nvSpPr>
-          <p:cNvPr id="5" name="Θέση κειμένου 4"/>
+              <a:rPr lang="pt-BR" smtClean="0"/>
+              <a:t>Quinto nível</a:t>
+            </a:r>
+            <a:endParaRPr lang="pt-BR" dirty="0"/>
+          </a:p>
+        </p:txBody>
+      </p:sp>
+      <p:sp>
+        <p:nvSpPr>
+          <p:cNvPr id="5" name="Marcador de Posição do Texto 4"/>
           <p:cNvSpPr>
             <a:spLocks noGrp="1"/>
           </p:cNvSpPr>
@@ -1975,15 +1976,15 @@
           <a:p>
             <a:pPr lvl="0"/>
             <a:r>
-              <a:rPr lang="el-GR" smtClean="0"/>
-              <a:t>Στυλ υποδείγματος κειμένου</a:t>
-            </a:r>
-          </a:p>
-        </p:txBody>
-      </p:sp>
-      <p:sp>
-        <p:nvSpPr>
-          <p:cNvPr id="6" name="Θέση περιεχομένου 5"/>
+              <a:rPr lang="pt-BR" smtClean="0"/>
+              <a:t>Clique para editar os estilos</a:t>
+            </a:r>
+          </a:p>
+        </p:txBody>
+      </p:sp>
+      <p:sp>
+        <p:nvSpPr>
+          <p:cNvPr id="6" name="Marcador de Posição de Conteúdo 5"/>
           <p:cNvSpPr>
             <a:spLocks noGrp="1"/>
           </p:cNvSpPr>
@@ -2003,44 +2004,44 @@
           <a:p>
             <a:pPr lvl="0"/>
             <a:r>
-              <a:rPr lang="el-GR" smtClean="0"/>
-              <a:t>Στυλ υποδείγματος κειμένου</a:t>
+              <a:rPr lang="pt-BR" smtClean="0"/>
+              <a:t>Clique para editar os estilos</a:t>
             </a:r>
           </a:p>
           <a:p>
             <a:pPr lvl="1"/>
             <a:r>
-              <a:rPr lang="el-GR" smtClean="0"/>
-              <a:t>Δεύτερου επιπέδου</a:t>
+              <a:rPr lang="pt-BR" smtClean="0"/>
+              <a:t>Segundo nível</a:t>
             </a:r>
           </a:p>
           <a:p>
             <a:pPr lvl="2"/>
             <a:r>
-              <a:rPr lang="el-GR" smtClean="0"/>
-              <a:t>Τρίτου επιπέδου</a:t>
+              <a:rPr lang="pt-BR" smtClean="0"/>
+              <a:t>Terceiro nível</a:t>
             </a:r>
           </a:p>
           <a:p>
             <a:pPr lvl="3"/>
             <a:r>
-              <a:rPr lang="el-GR" smtClean="0"/>
-              <a:t>Τέταρτου επιπέδου</a:t>
+              <a:rPr lang="pt-BR" smtClean="0"/>
+              <a:t>Quarto nível</a:t>
             </a:r>
           </a:p>
           <a:p>
             <a:pPr lvl="4"/>
             <a:r>
-              <a:rPr lang="el-GR" smtClean="0"/>
-              <a:t>Πέμπτου επιπέδου</a:t>
-            </a:r>
-            <a:endParaRPr lang="el-GR" dirty="0"/>
-          </a:p>
-        </p:txBody>
-      </p:sp>
-      <p:sp>
-        <p:nvSpPr>
-          <p:cNvPr id="7" name="Θέση ημερομηνίας 6"/>
+              <a:rPr lang="pt-BR" smtClean="0"/>
+              <a:t>Quinto nível</a:t>
+            </a:r>
+            <a:endParaRPr lang="pt-BR" dirty="0"/>
+          </a:p>
+        </p:txBody>
+      </p:sp>
+      <p:sp>
+        <p:nvSpPr>
+          <p:cNvPr id="7" name="Marcador de Posição da Data 6"/>
           <p:cNvSpPr>
             <a:spLocks noGrp="1"/>
           </p:cNvSpPr>
@@ -2054,16 +2055,16 @@
           <a:lstStyle/>
           <a:p>
             <a:fld id="{BCC18F51-09EC-435C-A3BA-64A766E099C0}" type="datetimeFigureOut">
-              <a:rPr lang="el-GR" smtClean="0"/>
+              <a:rPr lang="pt-BR" smtClean="0"/>
               <a:t>30.10.2013</a:t>
             </a:fld>
-            <a:endParaRPr lang="el-GR"/>
-          </a:p>
-        </p:txBody>
-      </p:sp>
-      <p:sp>
-        <p:nvSpPr>
-          <p:cNvPr id="8" name="Θέση υποσέλιδου 7"/>
+            <a:endParaRPr lang="pt-BR"/>
+          </a:p>
+        </p:txBody>
+      </p:sp>
+      <p:sp>
+        <p:nvSpPr>
+          <p:cNvPr id="8" name="Marcador de Posição do Rodapé 7"/>
           <p:cNvSpPr>
             <a:spLocks noGrp="1"/>
           </p:cNvSpPr>
@@ -2076,13 +2077,13 @@
           <a:bodyPr/>
           <a:lstStyle/>
           <a:p>
-            <a:endParaRPr lang="el-GR"/>
-          </a:p>
-        </p:txBody>
-      </p:sp>
-      <p:sp>
-        <p:nvSpPr>
-          <p:cNvPr id="9" name="Θέση αριθμού διαφάνειας 8"/>
+            <a:endParaRPr lang="pt-BR"/>
+          </a:p>
+        </p:txBody>
+      </p:sp>
+      <p:sp>
+        <p:nvSpPr>
+          <p:cNvPr id="9" name="Marcador de Posição do Número do Diapositivo 8"/>
           <p:cNvSpPr>
             <a:spLocks noGrp="1"/>
           </p:cNvSpPr>
@@ -2096,10 +2097,10 @@
           <a:lstStyle/>
           <a:p>
             <a:fld id="{08395586-F03A-48D1-94DF-16B239DF4FB5}" type="slidenum">
-              <a:rPr lang="el-GR" smtClean="0"/>
+              <a:rPr lang="pt-BR" smtClean="0"/>
               <a:t>‹#›</a:t>
             </a:fld>
-            <a:endParaRPr lang="el-GR"/>
+            <a:endParaRPr lang="pt-BR"/>
           </a:p>
         </p:txBody>
       </p:sp>
@@ -2118,7 +2119,7 @@
 
 <file path=ppt/slideLayouts/slideLayout6.xml><?xml version="1.0" encoding="utf-8"?>
 <p:sldLayout xmlns:a="http://schemas.openxmlformats.org/drawingml/2006/main" xmlns:r="http://schemas.openxmlformats.org/officeDocument/2006/relationships" xmlns:p="http://schemas.openxmlformats.org/presentationml/2006/main" type="titleOnly" preserve="1">
-  <p:cSld name="Μόνο τίτλος">
+  <p:cSld name="Só título">
     <p:spTree>
       <p:nvGrpSpPr>
         <p:cNvPr id="1" name=""/>
@@ -2135,7 +2136,7 @@
       </p:grpSpPr>
       <p:sp>
         <p:nvSpPr>
-          <p:cNvPr id="2" name="Τίτλος 1"/>
+          <p:cNvPr id="2" name="Título 1"/>
           <p:cNvSpPr>
             <a:spLocks noGrp="1"/>
           </p:cNvSpPr>
@@ -2149,16 +2150,16 @@
           <a:lstStyle/>
           <a:p>
             <a:r>
-              <a:rPr lang="el-GR" smtClean="0"/>
-              <a:t>Στυλ κύριου τίτλου</a:t>
-            </a:r>
-            <a:endParaRPr lang="el-GR" dirty="0"/>
-          </a:p>
-        </p:txBody>
-      </p:sp>
-      <p:sp>
-        <p:nvSpPr>
-          <p:cNvPr id="3" name="Θέση ημερομηνίας 2"/>
+              <a:rPr lang="pt-BR" smtClean="0"/>
+              <a:t>Clique para editar o estilo</a:t>
+            </a:r>
+            <a:endParaRPr lang="pt-BR" dirty="0"/>
+          </a:p>
+        </p:txBody>
+      </p:sp>
+      <p:sp>
+        <p:nvSpPr>
+          <p:cNvPr id="3" name="Marcador de Posição da Data 2"/>
           <p:cNvSpPr>
             <a:spLocks noGrp="1"/>
           </p:cNvSpPr>
@@ -2172,16 +2173,16 @@
           <a:lstStyle/>
           <a:p>
             <a:fld id="{BCC18F51-09EC-435C-A3BA-64A766E099C0}" type="datetimeFigureOut">
-              <a:rPr lang="el-GR" smtClean="0"/>
+              <a:rPr lang="pt-BR" smtClean="0"/>
               <a:t>30.10.2013</a:t>
             </a:fld>
-            <a:endParaRPr lang="el-GR"/>
-          </a:p>
-        </p:txBody>
-      </p:sp>
-      <p:sp>
-        <p:nvSpPr>
-          <p:cNvPr id="4" name="Θέση υποσέλιδου 3"/>
+            <a:endParaRPr lang="pt-BR"/>
+          </a:p>
+        </p:txBody>
+      </p:sp>
+      <p:sp>
+        <p:nvSpPr>
+          <p:cNvPr id="4" name="Marcador de Posição do Rodapé 3"/>
           <p:cNvSpPr>
             <a:spLocks noGrp="1"/>
           </p:cNvSpPr>
@@ -2194,13 +2195,13 @@
           <a:bodyPr/>
           <a:lstStyle/>
           <a:p>
-            <a:endParaRPr lang="el-GR"/>
-          </a:p>
-        </p:txBody>
-      </p:sp>
-      <p:sp>
-        <p:nvSpPr>
-          <p:cNvPr id="5" name="Θέση αριθμού διαφάνειας 4"/>
+            <a:endParaRPr lang="pt-BR"/>
+          </a:p>
+        </p:txBody>
+      </p:sp>
+      <p:sp>
+        <p:nvSpPr>
+          <p:cNvPr id="5" name="Marcador de Posição do Número do Diapositivo 4"/>
           <p:cNvSpPr>
             <a:spLocks noGrp="1"/>
           </p:cNvSpPr>
@@ -2214,10 +2215,10 @@
           <a:lstStyle/>
           <a:p>
             <a:fld id="{08395586-F03A-48D1-94DF-16B239DF4FB5}" type="slidenum">
-              <a:rPr lang="el-GR" smtClean="0"/>
+              <a:rPr lang="pt-BR" smtClean="0"/>
               <a:t>‹#›</a:t>
             </a:fld>
-            <a:endParaRPr lang="el-GR"/>
+            <a:endParaRPr lang="pt-BR"/>
           </a:p>
         </p:txBody>
       </p:sp>
@@ -2236,7 +2237,7 @@
 
 <file path=ppt/slideLayouts/slideLayout7.xml><?xml version="1.0" encoding="utf-8"?>
 <p:sldLayout xmlns:a="http://schemas.openxmlformats.org/drawingml/2006/main" xmlns:r="http://schemas.openxmlformats.org/officeDocument/2006/relationships" xmlns:p="http://schemas.openxmlformats.org/presentationml/2006/main" type="blank" preserve="1">
-  <p:cSld name="Κενή">
+  <p:cSld name="Em branco">
     <p:spTree>
       <p:nvGrpSpPr>
         <p:cNvPr id="1" name=""/>
@@ -2253,7 +2254,7 @@
       </p:grpSpPr>
       <p:sp>
         <p:nvSpPr>
-          <p:cNvPr id="2" name="Θέση ημερομηνίας 1"/>
+          <p:cNvPr id="2" name="Marcador de Posição da Data 1"/>
           <p:cNvSpPr>
             <a:spLocks noGrp="1"/>
           </p:cNvSpPr>
@@ -2267,16 +2268,16 @@
           <a:lstStyle/>
           <a:p>
             <a:fld id="{BCC18F51-09EC-435C-A3BA-64A766E099C0}" type="datetimeFigureOut">
-              <a:rPr lang="el-GR" smtClean="0"/>
+              <a:rPr lang="pt-BR" smtClean="0"/>
               <a:t>30.10.2013</a:t>
             </a:fld>
-            <a:endParaRPr lang="el-GR"/>
-          </a:p>
-        </p:txBody>
-      </p:sp>
-      <p:sp>
-        <p:nvSpPr>
-          <p:cNvPr id="3" name="Θέση υποσέλιδου 2"/>
+            <a:endParaRPr lang="pt-BR"/>
+          </a:p>
+        </p:txBody>
+      </p:sp>
+      <p:sp>
+        <p:nvSpPr>
+          <p:cNvPr id="3" name="Marcador de Posição do Rodapé 2"/>
           <p:cNvSpPr>
             <a:spLocks noGrp="1"/>
           </p:cNvSpPr>
@@ -2289,13 +2290,13 @@
           <a:bodyPr/>
           <a:lstStyle/>
           <a:p>
-            <a:endParaRPr lang="el-GR"/>
-          </a:p>
-        </p:txBody>
-      </p:sp>
-      <p:sp>
-        <p:nvSpPr>
-          <p:cNvPr id="4" name="Θέση αριθμού διαφάνειας 3"/>
+            <a:endParaRPr lang="pt-BR"/>
+          </a:p>
+        </p:txBody>
+      </p:sp>
+      <p:sp>
+        <p:nvSpPr>
+          <p:cNvPr id="4" name="Marcador de Posição do Número do Diapositivo 3"/>
           <p:cNvSpPr>
             <a:spLocks noGrp="1"/>
           </p:cNvSpPr>
@@ -2309,10 +2310,10 @@
           <a:lstStyle/>
           <a:p>
             <a:fld id="{08395586-F03A-48D1-94DF-16B239DF4FB5}" type="slidenum">
-              <a:rPr lang="el-GR" smtClean="0"/>
+              <a:rPr lang="pt-BR" smtClean="0"/>
               <a:t>‹#›</a:t>
             </a:fld>
-            <a:endParaRPr lang="el-GR"/>
+            <a:endParaRPr lang="pt-BR"/>
           </a:p>
         </p:txBody>
       </p:sp>
@@ -2331,7 +2332,7 @@
 
 <file path=ppt/slideLayouts/slideLayout8.xml><?xml version="1.0" encoding="utf-8"?>
 <p:sldLayout xmlns:a="http://schemas.openxmlformats.org/drawingml/2006/main" xmlns:r="http://schemas.openxmlformats.org/officeDocument/2006/relationships" xmlns:p="http://schemas.openxmlformats.org/presentationml/2006/main" type="objTx" preserve="1">
-  <p:cSld name="Περιεχόμενο με λεζάντα">
+  <p:cSld name="Conteúdo com Legenda">
     <p:spTree>
       <p:nvGrpSpPr>
         <p:cNvPr id="1" name=""/>
@@ -2348,7 +2349,7 @@
       </p:grpSpPr>
       <p:sp>
         <p:nvSpPr>
-          <p:cNvPr id="2" name="Τίτλος 1"/>
+          <p:cNvPr id="2" name="Título 1"/>
           <p:cNvSpPr>
             <a:spLocks noGrp="1"/>
           </p:cNvSpPr>
@@ -2371,16 +2372,16 @@
           </a:lstStyle>
           <a:p>
             <a:r>
-              <a:rPr lang="el-GR" smtClean="0"/>
-              <a:t>Στυλ κύριου τίτλου</a:t>
-            </a:r>
-            <a:endParaRPr lang="el-GR" dirty="0"/>
-          </a:p>
-        </p:txBody>
-      </p:sp>
-      <p:sp>
-        <p:nvSpPr>
-          <p:cNvPr id="3" name="Θέση περιεχομένου 2"/>
+              <a:rPr lang="pt-BR" smtClean="0"/>
+              <a:t>Clique para editar os estilos</a:t>
+            </a:r>
+            <a:endParaRPr lang="pt-BR" dirty="0"/>
+          </a:p>
+        </p:txBody>
+      </p:sp>
+      <p:sp>
+        <p:nvSpPr>
+          <p:cNvPr id="3" name="Marcador de Posição de Conteúdo 2"/>
           <p:cNvSpPr>
             <a:spLocks noGrp="1"/>
           </p:cNvSpPr>
@@ -2428,44 +2429,44 @@
           <a:p>
             <a:pPr lvl="0"/>
             <a:r>
-              <a:rPr lang="el-GR" smtClean="0"/>
-              <a:t>Στυλ υποδείγματος κειμένου</a:t>
+              <a:rPr lang="pt-BR" smtClean="0"/>
+              <a:t>Clique para editar os estilos</a:t>
             </a:r>
           </a:p>
           <a:p>
             <a:pPr lvl="1"/>
             <a:r>
-              <a:rPr lang="el-GR" smtClean="0"/>
-              <a:t>Δεύτερου επιπέδου</a:t>
+              <a:rPr lang="pt-BR" smtClean="0"/>
+              <a:t>Segundo nível</a:t>
             </a:r>
           </a:p>
           <a:p>
             <a:pPr lvl="2"/>
             <a:r>
-              <a:rPr lang="el-GR" smtClean="0"/>
-              <a:t>Τρίτου επιπέδου</a:t>
+              <a:rPr lang="pt-BR" smtClean="0"/>
+              <a:t>Terceiro nível</a:t>
             </a:r>
           </a:p>
           <a:p>
             <a:pPr lvl="3"/>
             <a:r>
-              <a:rPr lang="el-GR" smtClean="0"/>
-              <a:t>Τέταρτου επιπέδου</a:t>
+              <a:rPr lang="pt-BR" smtClean="0"/>
+              <a:t>Quarto nível</a:t>
             </a:r>
           </a:p>
           <a:p>
             <a:pPr lvl="4"/>
             <a:r>
-              <a:rPr lang="el-GR" smtClean="0"/>
-              <a:t>Πέμπτου επιπέδου</a:t>
-            </a:r>
-            <a:endParaRPr lang="el-GR" dirty="0"/>
-          </a:p>
-        </p:txBody>
-      </p:sp>
-      <p:sp>
-        <p:nvSpPr>
-          <p:cNvPr id="4" name="Θέση κειμένου 3"/>
+              <a:rPr lang="pt-BR" smtClean="0"/>
+              <a:t>Quinto nível</a:t>
+            </a:r>
+            <a:endParaRPr lang="pt-BR" dirty="0"/>
+          </a:p>
+        </p:txBody>
+      </p:sp>
+      <p:sp>
+        <p:nvSpPr>
+          <p:cNvPr id="4" name="Marcador de Posição do Texto 3"/>
           <p:cNvSpPr>
             <a:spLocks noGrp="1"/>
           </p:cNvSpPr>
@@ -2522,15 +2523,15 @@
           <a:p>
             <a:pPr lvl="0"/>
             <a:r>
-              <a:rPr lang="el-GR" smtClean="0"/>
-              <a:t>Στυλ υποδείγματος κειμένου</a:t>
-            </a:r>
-          </a:p>
-        </p:txBody>
-      </p:sp>
-      <p:sp>
-        <p:nvSpPr>
-          <p:cNvPr id="5" name="Θέση ημερομηνίας 4"/>
+              <a:rPr lang="pt-BR" smtClean="0"/>
+              <a:t>Clique para editar os estilos</a:t>
+            </a:r>
+          </a:p>
+        </p:txBody>
+      </p:sp>
+      <p:sp>
+        <p:nvSpPr>
+          <p:cNvPr id="5" name="Marcador de Posição da Data 4"/>
           <p:cNvSpPr>
             <a:spLocks noGrp="1"/>
           </p:cNvSpPr>
@@ -2544,16 +2545,16 @@
           <a:lstStyle/>
           <a:p>
             <a:fld id="{BCC18F51-09EC-435C-A3BA-64A766E099C0}" type="datetimeFigureOut">
-              <a:rPr lang="el-GR" smtClean="0"/>
+              <a:rPr lang="pt-BR" smtClean="0"/>
               <a:t>30.10.2013</a:t>
             </a:fld>
-            <a:endParaRPr lang="el-GR"/>
-          </a:p>
-        </p:txBody>
-      </p:sp>
-      <p:sp>
-        <p:nvSpPr>
-          <p:cNvPr id="6" name="Θέση υποσέλιδου 5"/>
+            <a:endParaRPr lang="pt-BR"/>
+          </a:p>
+        </p:txBody>
+      </p:sp>
+      <p:sp>
+        <p:nvSpPr>
+          <p:cNvPr id="6" name="Marcador de Posição do Rodapé 5"/>
           <p:cNvSpPr>
             <a:spLocks noGrp="1"/>
           </p:cNvSpPr>
@@ -2566,13 +2567,13 @@
           <a:bodyPr/>
           <a:lstStyle/>
           <a:p>
-            <a:endParaRPr lang="el-GR"/>
-          </a:p>
-        </p:txBody>
-      </p:sp>
-      <p:sp>
-        <p:nvSpPr>
-          <p:cNvPr id="7" name="Θέση αριθμού διαφάνειας 6"/>
+            <a:endParaRPr lang="pt-BR"/>
+          </a:p>
+        </p:txBody>
+      </p:sp>
+      <p:sp>
+        <p:nvSpPr>
+          <p:cNvPr id="7" name="Marcador de Posição do Número do Diapositivo 6"/>
           <p:cNvSpPr>
             <a:spLocks noGrp="1"/>
           </p:cNvSpPr>
@@ -2586,10 +2587,10 @@
           <a:lstStyle/>
           <a:p>
             <a:fld id="{08395586-F03A-48D1-94DF-16B239DF4FB5}" type="slidenum">
-              <a:rPr lang="el-GR" smtClean="0"/>
+              <a:rPr lang="pt-BR" smtClean="0"/>
               <a:t>‹#›</a:t>
             </a:fld>
-            <a:endParaRPr lang="el-GR"/>
+            <a:endParaRPr lang="pt-BR"/>
           </a:p>
         </p:txBody>
       </p:sp>
@@ -2608,7 +2609,7 @@
 
 <file path=ppt/slideLayouts/slideLayout9.xml><?xml version="1.0" encoding="utf-8"?>
 <p:sldLayout xmlns:a="http://schemas.openxmlformats.org/drawingml/2006/main" xmlns:r="http://schemas.openxmlformats.org/officeDocument/2006/relationships" xmlns:p="http://schemas.openxmlformats.org/presentationml/2006/main" type="picTx" preserve="1">
-  <p:cSld name="Εικόνα με λεζάντα">
+  <p:cSld name="Imagem com Legenda">
     <p:spTree>
       <p:nvGrpSpPr>
         <p:cNvPr id="1" name=""/>
@@ -2625,7 +2626,7 @@
       </p:grpSpPr>
       <p:sp>
         <p:nvSpPr>
-          <p:cNvPr id="2" name="Τίτλος 1"/>
+          <p:cNvPr id="2" name="Título 1"/>
           <p:cNvSpPr>
             <a:spLocks noGrp="1"/>
           </p:cNvSpPr>
@@ -2648,16 +2649,16 @@
           </a:lstStyle>
           <a:p>
             <a:r>
-              <a:rPr lang="el-GR" smtClean="0"/>
-              <a:t>Στυλ κύριου τίτλου</a:t>
-            </a:r>
-            <a:endParaRPr lang="el-GR" dirty="0"/>
-          </a:p>
-        </p:txBody>
-      </p:sp>
-      <p:sp>
-        <p:nvSpPr>
-          <p:cNvPr id="3" name="Θέση εικόνας 2"/>
+              <a:rPr lang="pt-BR" smtClean="0"/>
+              <a:t>Clique para editar o estilo</a:t>
+            </a:r>
+            <a:endParaRPr lang="pt-BR" dirty="0"/>
+          </a:p>
+        </p:txBody>
+      </p:sp>
+      <p:sp>
+        <p:nvSpPr>
+          <p:cNvPr id="3" name="Marcador de Posição da Imagem 2"/>
           <p:cNvSpPr>
             <a:spLocks noGrp="1" noChangeAspect="1"/>
           </p:cNvSpPr>
@@ -2713,16 +2714,16 @@
           </a:lstStyle>
           <a:p>
             <a:r>
-              <a:rPr lang="el-GR" smtClean="0"/>
-              <a:t>Κάντε κλικ στο εικονίδιο για να προσθέσετε εικόνα</a:t>
-            </a:r>
-            <a:endParaRPr lang="el-GR" dirty="0"/>
-          </a:p>
-        </p:txBody>
-      </p:sp>
-      <p:sp>
-        <p:nvSpPr>
-          <p:cNvPr id="4" name="Θέση κειμένου 3"/>
+              <a:rPr lang="pt-BR" smtClean="0"/>
+              <a:t>Clique no ícone para adicionar imagem</a:t>
+            </a:r>
+            <a:endParaRPr lang="pt-BR" dirty="0"/>
+          </a:p>
+        </p:txBody>
+      </p:sp>
+      <p:sp>
+        <p:nvSpPr>
+          <p:cNvPr id="4" name="Marcador de Posição do Texto 3"/>
           <p:cNvSpPr>
             <a:spLocks noGrp="1"/>
           </p:cNvSpPr>
@@ -2779,15 +2780,15 @@
           <a:p>
             <a:pPr lvl="0"/>
             <a:r>
-              <a:rPr lang="el-GR" smtClean="0"/>
-              <a:t>Στυλ υποδείγματος κειμένου</a:t>
-            </a:r>
-          </a:p>
-        </p:txBody>
-      </p:sp>
-      <p:sp>
-        <p:nvSpPr>
-          <p:cNvPr id="5" name="Θέση ημερομηνίας 4"/>
+              <a:rPr lang="pt-BR" smtClean="0"/>
+              <a:t>Clique para editar os estilos</a:t>
+            </a:r>
+          </a:p>
+        </p:txBody>
+      </p:sp>
+      <p:sp>
+        <p:nvSpPr>
+          <p:cNvPr id="5" name="Marcador de Posição da Data 4"/>
           <p:cNvSpPr>
             <a:spLocks noGrp="1"/>
           </p:cNvSpPr>
@@ -2801,16 +2802,16 @@
           <a:lstStyle/>
           <a:p>
             <a:fld id="{BCC18F51-09EC-435C-A3BA-64A766E099C0}" type="datetimeFigureOut">
-              <a:rPr lang="el-GR" smtClean="0"/>
+              <a:rPr lang="pt-BR" smtClean="0"/>
               <a:t>30.10.2013</a:t>
             </a:fld>
-            <a:endParaRPr lang="el-GR"/>
-          </a:p>
-        </p:txBody>
-      </p:sp>
-      <p:sp>
-        <p:nvSpPr>
-          <p:cNvPr id="6" name="Θέση υποσέλιδου 5"/>
+            <a:endParaRPr lang="pt-BR"/>
+          </a:p>
+        </p:txBody>
+      </p:sp>
+      <p:sp>
+        <p:nvSpPr>
+          <p:cNvPr id="6" name="Marcador de Posição do Rodapé 5"/>
           <p:cNvSpPr>
             <a:spLocks noGrp="1"/>
           </p:cNvSpPr>
@@ -2823,13 +2824,13 @@
           <a:bodyPr/>
           <a:lstStyle/>
           <a:p>
-            <a:endParaRPr lang="el-GR"/>
-          </a:p>
-        </p:txBody>
-      </p:sp>
-      <p:sp>
-        <p:nvSpPr>
-          <p:cNvPr id="7" name="Θέση αριθμού διαφάνειας 6"/>
+            <a:endParaRPr lang="pt-BR"/>
+          </a:p>
+        </p:txBody>
+      </p:sp>
+      <p:sp>
+        <p:nvSpPr>
+          <p:cNvPr id="7" name="Marcador de Posição do Número do Diapositivo 6"/>
           <p:cNvSpPr>
             <a:spLocks noGrp="1"/>
           </p:cNvSpPr>
@@ -2843,10 +2844,10 @@
           <a:lstStyle/>
           <a:p>
             <a:fld id="{08395586-F03A-48D1-94DF-16B239DF4FB5}" type="slidenum">
-              <a:rPr lang="el-GR" smtClean="0"/>
+              <a:rPr lang="pt-BR" smtClean="0"/>
               <a:t>‹#›</a:t>
             </a:fld>
-            <a:endParaRPr lang="el-GR"/>
+            <a:endParaRPr lang="pt-BR"/>
           </a:p>
         </p:txBody>
       </p:sp>
@@ -2887,7 +2888,7 @@
       </p:grpSpPr>
       <p:sp>
         <p:nvSpPr>
-          <p:cNvPr id="2" name="Θέση τίτλου 1"/>
+          <p:cNvPr id="2" name="Marcador de Posição do Título 1"/>
           <p:cNvSpPr>
             <a:spLocks noGrp="1"/>
           </p:cNvSpPr>
@@ -2911,16 +2912,16 @@
           <a:lstStyle/>
           <a:p>
             <a:r>
-              <a:rPr lang="el-GR" smtClean="0"/>
-              <a:t>Στυλ κύριου τίτλου</a:t>
-            </a:r>
-            <a:endParaRPr lang="el-GR" dirty="0"/>
-          </a:p>
-        </p:txBody>
-      </p:sp>
-      <p:sp>
-        <p:nvSpPr>
-          <p:cNvPr id="3" name="Θέση κειμένου 2"/>
+              <a:rPr lang="pt-BR" smtClean="0"/>
+              <a:t>Clique para editar o estilo</a:t>
+            </a:r>
+            <a:endParaRPr lang="pt-BR" dirty="0"/>
+          </a:p>
+        </p:txBody>
+      </p:sp>
+      <p:sp>
+        <p:nvSpPr>
+          <p:cNvPr id="3" name="Marcador de Posição do Texto 2"/>
           <p:cNvSpPr>
             <a:spLocks noGrp="1"/>
           </p:cNvSpPr>
@@ -2945,44 +2946,44 @@
           <a:p>
             <a:pPr lvl="0"/>
             <a:r>
-              <a:rPr lang="el-GR" smtClean="0"/>
-              <a:t>Στυλ υποδείγματος κειμένου</a:t>
+              <a:rPr lang="pt-BR" smtClean="0"/>
+              <a:t>Clique para editar os estilos</a:t>
             </a:r>
           </a:p>
           <a:p>
             <a:pPr lvl="1"/>
             <a:r>
-              <a:rPr lang="el-GR" smtClean="0"/>
-              <a:t>Δεύτερου επιπέδου</a:t>
+              <a:rPr lang="pt-BR" smtClean="0"/>
+              <a:t>Segundo nível</a:t>
             </a:r>
           </a:p>
           <a:p>
             <a:pPr lvl="2"/>
             <a:r>
-              <a:rPr lang="el-GR" smtClean="0"/>
-              <a:t>Τρίτου επιπέδου</a:t>
+              <a:rPr lang="pt-BR" smtClean="0"/>
+              <a:t>Terceiro nível</a:t>
             </a:r>
           </a:p>
           <a:p>
             <a:pPr lvl="3"/>
             <a:r>
-              <a:rPr lang="el-GR" smtClean="0"/>
-              <a:t>Τέταρτου επιπέδου</a:t>
+              <a:rPr lang="pt-BR" smtClean="0"/>
+              <a:t>Quarto nível</a:t>
             </a:r>
           </a:p>
           <a:p>
             <a:pPr lvl="4"/>
             <a:r>
-              <a:rPr lang="el-GR" smtClean="0"/>
-              <a:t>Πέμπτου επιπέδου</a:t>
-            </a:r>
-            <a:endParaRPr lang="el-GR" dirty="0"/>
-          </a:p>
-        </p:txBody>
-      </p:sp>
-      <p:sp>
-        <p:nvSpPr>
-          <p:cNvPr id="4" name="Θέση ημερομηνίας 3"/>
+              <a:rPr lang="pt-BR" smtClean="0"/>
+              <a:t>Quinto nível</a:t>
+            </a:r>
+            <a:endParaRPr lang="pt-BR" dirty="0"/>
+          </a:p>
+        </p:txBody>
+      </p:sp>
+      <p:sp>
+        <p:nvSpPr>
+          <p:cNvPr id="4" name="Marcador de Posição da Data 3"/>
           <p:cNvSpPr>
             <a:spLocks noGrp="1"/>
           </p:cNvSpPr>
@@ -3014,16 +3015,16 @@
           </a:lstStyle>
           <a:p>
             <a:fld id="{BCC18F51-09EC-435C-A3BA-64A766E099C0}" type="datetimeFigureOut">
-              <a:rPr lang="el-GR" smtClean="0"/>
+              <a:rPr lang="pt-BR" smtClean="0"/>
               <a:t>30.10.2013</a:t>
             </a:fld>
-            <a:endParaRPr lang="el-GR"/>
-          </a:p>
-        </p:txBody>
-      </p:sp>
-      <p:sp>
-        <p:nvSpPr>
-          <p:cNvPr id="5" name="Θέση υποσέλιδου 4"/>
+            <a:endParaRPr lang="pt-BR"/>
+          </a:p>
+        </p:txBody>
+      </p:sp>
+      <p:sp>
+        <p:nvSpPr>
+          <p:cNvPr id="5" name="Marcador de Posição do Rodapé 4"/>
           <p:cNvSpPr>
             <a:spLocks noGrp="1"/>
           </p:cNvSpPr>
@@ -3054,13 +3055,13 @@
             </a:lvl1pPr>
           </a:lstStyle>
           <a:p>
-            <a:endParaRPr lang="el-GR"/>
-          </a:p>
-        </p:txBody>
-      </p:sp>
-      <p:sp>
-        <p:nvSpPr>
-          <p:cNvPr id="6" name="Θέση αριθμού διαφάνειας 5"/>
+            <a:endParaRPr lang="pt-BR"/>
+          </a:p>
+        </p:txBody>
+      </p:sp>
+      <p:sp>
+        <p:nvSpPr>
+          <p:cNvPr id="6" name="Marcador de Posição do Número do Diapositivo 5"/>
           <p:cNvSpPr>
             <a:spLocks noGrp="1"/>
           </p:cNvSpPr>
@@ -3092,10 +3093,10 @@
           </a:lstStyle>
           <a:p>
             <a:fld id="{08395586-F03A-48D1-94DF-16B239DF4FB5}" type="slidenum">
-              <a:rPr lang="el-GR" smtClean="0"/>
+              <a:rPr lang="pt-BR" smtClean="0"/>
               <a:t>‹#›</a:t>
             </a:fld>
-            <a:endParaRPr lang="el-GR"/>
+            <a:endParaRPr lang="pt-BR"/>
           </a:p>
         </p:txBody>
       </p:sp>
@@ -3306,7 +3307,7 @@
     </p:bodyStyle>
     <p:otherStyle>
       <a:defPPr>
-        <a:defRPr lang="el-GR"/>
+        <a:defRPr lang="pt-BR"/>
       </a:defPPr>
       <a:lvl1pPr marL="0" algn="l" defTabSz="914400" rtl="0" eaLnBrk="1" latinLnBrk="0" hangingPunct="1">
         <a:defRPr sz="1800" kern="1200">
@@ -3422,7 +3423,7 @@
       </p:grpSpPr>
       <p:sp>
         <p:nvSpPr>
-          <p:cNvPr id="2" name="Τίτλος 1"/>
+          <p:cNvPr id="2" name="Title 1"/>
           <p:cNvSpPr>
             <a:spLocks noGrp="1"/>
           </p:cNvSpPr>
@@ -3435,13 +3436,13 @@
           <a:bodyPr/>
           <a:lstStyle/>
           <a:p>
-            <a:endParaRPr lang="el-GR" dirty="0"/>
-          </a:p>
-        </p:txBody>
-      </p:sp>
-      <p:sp>
-        <p:nvSpPr>
-          <p:cNvPr id="3" name="Υπότιτλος 2"/>
+            <a:endParaRPr lang="pt-BR" dirty="0"/>
+          </a:p>
+        </p:txBody>
+      </p:sp>
+      <p:sp>
+        <p:nvSpPr>
+          <p:cNvPr id="3" name="Subtitle 2"/>
           <p:cNvSpPr>
             <a:spLocks noGrp="1"/>
           </p:cNvSpPr>
@@ -3454,7 +3455,7 @@
           <a:bodyPr/>
           <a:lstStyle/>
           <a:p>
-            <a:endParaRPr lang="el-GR" dirty="0"/>
+            <a:endParaRPr lang="pt-BR" dirty="0"/>
           </a:p>
         </p:txBody>
       </p:sp>

</xml_diff>